<commit_message>
Updating presentation file; adding before and after code example dirs
</commit_message>
<xml_diff>
--- a/slides/svg-presentation.pptx
+++ b/slides/svg-presentation.pptx
@@ -2993,28 +2993,77 @@
         </p:nvSpPr>
         <p:spPr>
           <a:xfrm>
-            <a:off x="1270000" y="4232969"/>
-            <a:ext cx="10464800" cy="1287662"/>
+            <a:off x="-3308" y="181669"/>
+            <a:ext cx="13011416" cy="1409569"/>
           </a:xfrm>
           <a:prstGeom prst="rect">
             <a:avLst/>
           </a:prstGeom>
+          <a:gradFill>
+            <a:gsLst>
+              <a:gs pos="0">
+                <a:schemeClr val="accent2">
+                  <a:hueOff val="-2473793"/>
+                  <a:satOff val="-50209"/>
+                  <a:lumOff val="23543"/>
+                </a:schemeClr>
+              </a:gs>
+              <a:gs pos="100000">
+                <a:schemeClr val="accent2"/>
+              </a:gs>
+            </a:gsLst>
+            <a:lin ang="5400000"/>
+          </a:gradFill>
         </p:spPr>
         <p:txBody>
-          <a:bodyPr/>
+          <a:bodyPr anchor="ctr"/>
           <a:lstStyle>
-            <a:lvl1pPr defTabSz="560831">
-              <a:defRPr sz="7679"/>
+            <a:lvl1pPr>
+              <a:defRPr>
+                <a:solidFill>
+                  <a:srgbClr val="FFFFFF"/>
+                </a:solidFill>
+              </a:defRPr>
             </a:lvl1pPr>
           </a:lstStyle>
           <a:p>
             <a:pPr/>
             <a:r>
-              <a:t>Introduction to SVG</a:t>
+              <a:t>Introduction to</a:t>
             </a:r>
           </a:p>
         </p:txBody>
       </p:sp>
+      <p:pic>
+        <p:nvPicPr>
+          <p:cNvPr id="120" name="pasted-image-filtered.png"/>
+          <p:cNvPicPr>
+            <a:picLocks noChangeAspect="1"/>
+          </p:cNvPicPr>
+          <p:nvPr/>
+        </p:nvPicPr>
+        <p:blipFill>
+          <a:blip r:embed="rId2">
+            <a:extLst/>
+          </a:blip>
+          <a:srcRect l="0" t="0" r="0" b="0"/>
+          <a:stretch>
+            <a:fillRect/>
+          </a:stretch>
+        </p:blipFill>
+        <p:spPr>
+          <a:xfrm>
+            <a:off x="3559282" y="2657582"/>
+            <a:ext cx="5886236" cy="5886236"/>
+          </a:xfrm>
+          <a:prstGeom prst="rect">
+            <a:avLst/>
+          </a:prstGeom>
+          <a:ln w="12700">
+            <a:miter lim="400000"/>
+          </a:ln>
+        </p:spPr>
+      </p:pic>
     </p:spTree>
   </p:cSld>
   <p:clrMapOvr>
@@ -3043,13 +3092,76 @@
       </p:grpSpPr>
       <p:sp>
         <p:nvSpPr>
-          <p:cNvPr id="121" name="Shape 121"/>
+          <p:cNvPr id="122" name="Shape 122"/>
+          <p:cNvSpPr/>
+          <p:nvPr/>
+        </p:nvSpPr>
+        <p:spPr>
+          <a:xfrm>
+            <a:off x="-3308" y="181669"/>
+            <a:ext cx="13011416" cy="1409569"/>
+          </a:xfrm>
+          <a:prstGeom prst="rect">
+            <a:avLst/>
+          </a:prstGeom>
+          <a:gradFill>
+            <a:gsLst>
+              <a:gs pos="0">
+                <a:schemeClr val="accent2">
+                  <a:hueOff val="-2473793"/>
+                  <a:satOff val="-50209"/>
+                  <a:lumOff val="23543"/>
+                </a:schemeClr>
+              </a:gs>
+              <a:gs pos="100000">
+                <a:schemeClr val="accent2"/>
+              </a:gs>
+            </a:gsLst>
+            <a:lin ang="5400000"/>
+          </a:gradFill>
+          <a:ln w="12700">
+            <a:miter lim="400000"/>
+          </a:ln>
+          <a:extLst>
+            <a:ext uri="{C572A759-6A51-4108-AA02-DFA0A04FC94B}">
+              <ma14:wrappingTextBoxFlag xmlns:ma14="http://schemas.microsoft.com/office/mac/drawingml/2011/main" val="1"/>
+            </a:ext>
+          </a:extLst>
+        </p:spPr>
+        <p:txBody>
+          <a:bodyPr lIns="50800" tIns="50800" rIns="50800" bIns="50800" anchor="ctr">
+            <a:normAutofit fontScale="100000" lnSpcReduction="0"/>
+          </a:bodyPr>
+          <a:lstStyle>
+            <a:lvl1pPr>
+              <a:defRPr sz="8000">
+                <a:solidFill>
+                  <a:srgbClr val="FFFFFF"/>
+                </a:solidFill>
+              </a:defRPr>
+            </a:lvl1pPr>
+          </a:lstStyle>
+          <a:p>
+            <a:pPr/>
+            <a:r>
+              <a:t>What is SVG?</a:t>
+            </a:r>
+          </a:p>
+        </p:txBody>
+      </p:sp>
+      <p:sp>
+        <p:nvSpPr>
+          <p:cNvPr id="123" name="Shape 123"/>
           <p:cNvSpPr/>
           <p:nvPr>
-            <p:ph type="title"/>
+            <p:ph type="body" sz="quarter" idx="1"/>
           </p:nvPr>
         </p:nvSpPr>
         <p:spPr>
+          <a:xfrm>
+            <a:off x="1545166" y="3384550"/>
+            <a:ext cx="3664083" cy="4102101"/>
+          </a:xfrm>
           <a:prstGeom prst="rect">
             <a:avLst/>
           </a:prstGeom>
@@ -3058,43 +3170,16 @@
           <a:bodyPr/>
           <a:lstStyle/>
           <a:p>
-            <a:pPr/>
-            <a:r>
-              <a:t>What is SVG?</a:t>
-            </a:r>
-          </a:p>
-        </p:txBody>
-      </p:sp>
-      <p:sp>
-        <p:nvSpPr>
-          <p:cNvPr id="122" name="Shape 122"/>
-          <p:cNvSpPr/>
-          <p:nvPr>
-            <p:ph type="body" sz="quarter" idx="1"/>
-          </p:nvPr>
-        </p:nvSpPr>
-        <p:spPr>
-          <a:prstGeom prst="rect">
-            <a:avLst/>
-          </a:prstGeom>
-        </p:spPr>
-        <p:txBody>
-          <a:bodyPr/>
-          <a:lstStyle/>
-          <a:p>
-            <a:pPr/>
-            <a:r>
-              <a:t>= </a:t>
-            </a:r>
-          </a:p>
-          <a:p>
-            <a:pPr lvl="8" marL="0" indent="1828800">
-              <a:spcBef>
-                <a:spcPts val="0"/>
-              </a:spcBef>
-              <a:buSzTx/>
-              <a:buNone/>
-              <a:defRPr sz="3200"/>
+            <a:pPr algn="l">
+              <a:defRPr sz="6000"/>
+            </a:pPr>
+            <a:r>
+              <a:t>=</a:t>
+            </a:r>
+          </a:p>
+          <a:p>
+            <a:pPr algn="l">
+              <a:defRPr sz="6000"/>
             </a:pPr>
             <a:r>
               <a:rPr b="1">
@@ -3108,16 +3193,6 @@
             <a:r>
               <a:t>calable </a:t>
             </a:r>
-          </a:p>
-          <a:p>
-            <a:pPr lvl="8" marL="0" indent="1828800">
-              <a:spcBef>
-                <a:spcPts val="0"/>
-              </a:spcBef>
-              <a:buSzTx/>
-              <a:buNone/>
-              <a:defRPr sz="3200"/>
-            </a:pPr>
             <a:r>
               <a:rPr b="1">
                 <a:latin typeface="Helvetica"/>
@@ -3130,16 +3205,6 @@
             <a:r>
               <a:t>ector </a:t>
             </a:r>
-          </a:p>
-          <a:p>
-            <a:pPr lvl="8" marL="0" indent="1828800">
-              <a:spcBef>
-                <a:spcPts val="0"/>
-              </a:spcBef>
-              <a:buSzTx/>
-              <a:buNone/>
-              <a:defRPr sz="3200"/>
-            </a:pPr>
             <a:r>
               <a:rPr b="1">
                 <a:latin typeface="Helvetica"/>
@@ -3157,14 +3222,14 @@
       </p:sp>
       <p:sp>
         <p:nvSpPr>
-          <p:cNvPr id="123" name="Shape 123"/>
+          <p:cNvPr id="124" name="Shape 124"/>
           <p:cNvSpPr/>
           <p:nvPr/>
         </p:nvSpPr>
         <p:spPr>
           <a:xfrm>
-            <a:off x="7670800" y="2152040"/>
-            <a:ext cx="2377331" cy="2404369"/>
+            <a:off x="6804654" y="2709898"/>
+            <a:ext cx="3098209" cy="3133445"/>
           </a:xfrm>
           <a:prstGeom prst="rect">
             <a:avLst/>
@@ -3199,14 +3264,14 @@
       </p:sp>
       <p:sp>
         <p:nvSpPr>
-          <p:cNvPr id="124" name="Shape 124"/>
+          <p:cNvPr id="125" name="Shape 125"/>
           <p:cNvSpPr/>
           <p:nvPr/>
         </p:nvSpPr>
         <p:spPr>
           <a:xfrm>
-            <a:off x="8597900" y="3815740"/>
-            <a:ext cx="2814985" cy="2814986"/>
+            <a:off x="8758291" y="4196448"/>
+            <a:ext cx="3559192" cy="3629770"/>
           </a:xfrm>
           <a:prstGeom prst="ellipse">
             <a:avLst/>
@@ -3245,24 +3310,23 @@
       </p:sp>
       <p:sp>
         <p:nvSpPr>
-          <p:cNvPr id="125" name="Shape 125"/>
+          <p:cNvPr id="126" name="Shape 126"/>
           <p:cNvSpPr/>
           <p:nvPr/>
         </p:nvSpPr>
         <p:spPr>
           <a:xfrm>
-            <a:off x="7874592" y="4793640"/>
-            <a:ext cx="2517998" cy="2517999"/>
+            <a:off x="6759971" y="5111221"/>
+            <a:ext cx="3487350" cy="3487351"/>
           </a:xfrm>
           <a:prstGeom prst="line">
             <a:avLst/>
           </a:prstGeom>
           <a:ln w="101600">
             <a:solidFill>
-              <a:schemeClr val="accent2">
-                <a:hueOff val="-2473793"/>
-                <a:satOff val="-50209"/>
-                <a:lumOff val="23543"/>
+              <a:schemeClr val="accent3">
+                <a:satOff val="18648"/>
+                <a:lumOff val="5971"/>
               </a:schemeClr>
             </a:solidFill>
             <a:miter lim="400000"/>
@@ -3274,6 +3338,82 @@
           <a:p>
             <a:pPr>
               <a:defRPr sz="2400"/>
+            </a:pPr>
+          </a:p>
+        </p:txBody>
+      </p:sp>
+      <p:sp>
+        <p:nvSpPr>
+          <p:cNvPr id="127" name="Shape 127"/>
+          <p:cNvSpPr/>
+          <p:nvPr/>
+        </p:nvSpPr>
+        <p:spPr>
+          <a:xfrm>
+            <a:off x="7380091" y="6403203"/>
+            <a:ext cx="4014260" cy="1862734"/>
+          </a:xfrm>
+          <a:custGeom>
+            <a:avLst/>
+            <a:gdLst/>
+            <a:ahLst/>
+            <a:cxnLst>
+              <a:cxn ang="0">
+                <a:pos x="wd2" y="hd2"/>
+              </a:cxn>
+              <a:cxn ang="5400000">
+                <a:pos x="wd2" y="hd2"/>
+              </a:cxn>
+              <a:cxn ang="10800000">
+                <a:pos x="wd2" y="hd2"/>
+              </a:cxn>
+              <a:cxn ang="16200000">
+                <a:pos x="wd2" y="hd2"/>
+              </a:cxn>
+            </a:cxnLst>
+            <a:rect l="0" t="0" r="r" b="b"/>
+            <a:pathLst>
+              <a:path w="21600" h="21600" fill="norm" stroke="1" extrusionOk="0">
+                <a:moveTo>
+                  <a:pt x="0" y="0"/>
+                </a:moveTo>
+                <a:lnTo>
+                  <a:pt x="0" y="21600"/>
+                </a:lnTo>
+                <a:lnTo>
+                  <a:pt x="21600" y="21600"/>
+                </a:lnTo>
+                <a:close/>
+              </a:path>
+            </a:pathLst>
+          </a:custGeom>
+          <a:solidFill>
+            <a:schemeClr val="accent1">
+              <a:satOff val="-3355"/>
+              <a:lumOff val="26614"/>
+            </a:schemeClr>
+          </a:solidFill>
+          <a:ln w="12700">
+            <a:miter lim="400000"/>
+          </a:ln>
+          <a:effectLst>
+            <a:outerShdw sx="100000" sy="100000" kx="0" ky="0" algn="b" rotWithShape="0" blurRad="38100" dist="25400" dir="5400000">
+              <a:srgbClr val="000000">
+                <a:alpha val="50000"/>
+              </a:srgbClr>
+            </a:outerShdw>
+          </a:effectLst>
+        </p:spPr>
+        <p:txBody>
+          <a:bodyPr lIns="50800" tIns="50800" rIns="50800" bIns="50800" anchor="ctr"/>
+          <a:lstStyle/>
+          <a:p>
+            <a:pPr>
+              <a:defRPr sz="2400">
+                <a:solidFill>
+                  <a:srgbClr val="FFFFFF"/>
+                </a:solidFill>
+              </a:defRPr>
             </a:pPr>
           </a:p>
         </p:txBody>
@@ -3304,33 +3444,9 @@
           <a:chExt cx="0" cy="0"/>
         </a:xfrm>
       </p:grpSpPr>
-      <p:sp>
-        <p:nvSpPr>
-          <p:cNvPr id="127" name="Shape 127"/>
-          <p:cNvSpPr/>
-          <p:nvPr>
-            <p:ph type="title"/>
-          </p:nvPr>
-        </p:nvSpPr>
-        <p:spPr>
-          <a:prstGeom prst="rect">
-            <a:avLst/>
-          </a:prstGeom>
-        </p:spPr>
-        <p:txBody>
-          <a:bodyPr/>
-          <a:lstStyle/>
-          <a:p>
-            <a:pPr/>
-            <a:r>
-              <a:t>SVG vs. Image</a:t>
-            </a:r>
-          </a:p>
-        </p:txBody>
-      </p:sp>
       <p:graphicFrame>
         <p:nvGraphicFramePr>
-          <p:cNvPr id="128" name="Table 128"/>
+          <p:cNvPr id="129" name="Table 129"/>
           <p:cNvGraphicFramePr/>
           <p:nvPr/>
         </p:nvGraphicFramePr>
@@ -3576,6 +3692,65 @@
           </a:graphicData>
         </a:graphic>
       </p:graphicFrame>
+      <p:sp>
+        <p:nvSpPr>
+          <p:cNvPr id="130" name="Shape 130"/>
+          <p:cNvSpPr/>
+          <p:nvPr/>
+        </p:nvSpPr>
+        <p:spPr>
+          <a:xfrm>
+            <a:off x="-3308" y="181669"/>
+            <a:ext cx="13011416" cy="1409569"/>
+          </a:xfrm>
+          <a:prstGeom prst="rect">
+            <a:avLst/>
+          </a:prstGeom>
+          <a:gradFill>
+            <a:gsLst>
+              <a:gs pos="0">
+                <a:schemeClr val="accent2">
+                  <a:hueOff val="-2473793"/>
+                  <a:satOff val="-50209"/>
+                  <a:lumOff val="23543"/>
+                </a:schemeClr>
+              </a:gs>
+              <a:gs pos="100000">
+                <a:schemeClr val="accent2"/>
+              </a:gs>
+            </a:gsLst>
+            <a:lin ang="5400000"/>
+          </a:gradFill>
+          <a:ln w="12700">
+            <a:miter lim="400000"/>
+          </a:ln>
+          <a:extLst>
+            <a:ext uri="{C572A759-6A51-4108-AA02-DFA0A04FC94B}">
+              <ma14:wrappingTextBoxFlag xmlns:ma14="http://schemas.microsoft.com/office/mac/drawingml/2011/main" val="1"/>
+            </a:ext>
+          </a:extLst>
+        </p:spPr>
+        <p:txBody>
+          <a:bodyPr lIns="50800" tIns="50800" rIns="50800" bIns="50800" anchor="ctr">
+            <a:normAutofit fontScale="100000" lnSpcReduction="0"/>
+          </a:bodyPr>
+          <a:lstStyle>
+            <a:lvl1pPr>
+              <a:defRPr sz="8000">
+                <a:solidFill>
+                  <a:srgbClr val="FFFFFF"/>
+                </a:solidFill>
+              </a:defRPr>
+            </a:lvl1pPr>
+          </a:lstStyle>
+          <a:p>
+            <a:pPr/>
+            <a:r>
+              <a:t>SVG vs. Image</a:t>
+            </a:r>
+          </a:p>
+        </p:txBody>
+      </p:sp>
     </p:spTree>
   </p:cSld>
   <p:clrMapOvr>
@@ -3604,13 +3779,17 @@
       </p:grpSpPr>
       <p:sp>
         <p:nvSpPr>
-          <p:cNvPr id="130" name="Shape 130"/>
+          <p:cNvPr id="132" name="Shape 132"/>
           <p:cNvSpPr/>
           <p:nvPr>
-            <p:ph type="title"/>
+            <p:ph type="body" sz="half" idx="1"/>
           </p:nvPr>
         </p:nvSpPr>
         <p:spPr>
+          <a:xfrm>
+            <a:off x="952499" y="3155387"/>
+            <a:ext cx="11099801" cy="3595226"/>
+          </a:xfrm>
           <a:prstGeom prst="rect">
             <a:avLst/>
           </a:prstGeom>
@@ -3619,32 +3798,8 @@
           <a:bodyPr/>
           <a:lstStyle/>
           <a:p>
-            <a:pPr/>
-            <a:r>
-              <a:t>How do I make a SVG?</a:t>
-            </a:r>
-          </a:p>
-        </p:txBody>
-      </p:sp>
-      <p:sp>
-        <p:nvSpPr>
-          <p:cNvPr id="131" name="Shape 131"/>
-          <p:cNvSpPr/>
-          <p:nvPr>
-            <p:ph type="body" idx="1"/>
-          </p:nvPr>
-        </p:nvSpPr>
-        <p:spPr>
-          <a:prstGeom prst="rect">
-            <a:avLst/>
-          </a:prstGeom>
-        </p:spPr>
-        <p:txBody>
-          <a:bodyPr/>
-          <a:lstStyle/>
-          <a:p>
             <a:pPr>
-              <a:defRPr b="1">
+              <a:defRPr b="1" sz="4400">
                 <a:latin typeface="Helvetica"/>
                 <a:ea typeface="Helvetica"/>
                 <a:cs typeface="Helvetica"/>
@@ -3672,7 +3827,7 @@
           </a:p>
           <a:p>
             <a:pPr>
-              <a:defRPr b="1">
+              <a:defRPr b="1" sz="4400">
                 <a:latin typeface="Helvetica"/>
                 <a:ea typeface="Helvetica"/>
                 <a:cs typeface="Helvetica"/>
@@ -3690,6 +3845,65 @@
                 <a:sym typeface="Helvetica Light"/>
               </a:rPr>
               <a:t> Code it yourself!</a:t>
+            </a:r>
+          </a:p>
+        </p:txBody>
+      </p:sp>
+      <p:sp>
+        <p:nvSpPr>
+          <p:cNvPr id="133" name="Shape 133"/>
+          <p:cNvSpPr/>
+          <p:nvPr/>
+        </p:nvSpPr>
+        <p:spPr>
+          <a:xfrm>
+            <a:off x="-3308" y="181669"/>
+            <a:ext cx="13011416" cy="1409569"/>
+          </a:xfrm>
+          <a:prstGeom prst="rect">
+            <a:avLst/>
+          </a:prstGeom>
+          <a:gradFill>
+            <a:gsLst>
+              <a:gs pos="0">
+                <a:schemeClr val="accent2">
+                  <a:hueOff val="-2473793"/>
+                  <a:satOff val="-50209"/>
+                  <a:lumOff val="23543"/>
+                </a:schemeClr>
+              </a:gs>
+              <a:gs pos="100000">
+                <a:schemeClr val="accent2"/>
+              </a:gs>
+            </a:gsLst>
+            <a:lin ang="5400000"/>
+          </a:gradFill>
+          <a:ln w="12700">
+            <a:miter lim="400000"/>
+          </a:ln>
+          <a:extLst>
+            <a:ext uri="{C572A759-6A51-4108-AA02-DFA0A04FC94B}">
+              <ma14:wrappingTextBoxFlag xmlns:ma14="http://schemas.microsoft.com/office/mac/drawingml/2011/main" val="1"/>
+            </a:ext>
+          </a:extLst>
+        </p:spPr>
+        <p:txBody>
+          <a:bodyPr lIns="50800" tIns="50800" rIns="50800" bIns="50800" anchor="ctr">
+            <a:normAutofit fontScale="100000" lnSpcReduction="0"/>
+          </a:bodyPr>
+          <a:lstStyle>
+            <a:lvl1pPr>
+              <a:defRPr sz="8000">
+                <a:solidFill>
+                  <a:srgbClr val="FFFFFF"/>
+                </a:solidFill>
+              </a:defRPr>
+            </a:lvl1pPr>
+          </a:lstStyle>
+          <a:p>
+            <a:pPr/>
+            <a:r>
+              <a:t>How do I make a SVG?</a:t>
             </a:r>
           </a:p>
         </p:txBody>
@@ -3722,13 +3936,17 @@
       </p:grpSpPr>
       <p:sp>
         <p:nvSpPr>
-          <p:cNvPr id="133" name="Shape 133"/>
+          <p:cNvPr id="135" name="Shape 135"/>
           <p:cNvSpPr/>
           <p:nvPr>
-            <p:ph type="title"/>
+            <p:ph type="body" idx="1"/>
           </p:nvPr>
         </p:nvSpPr>
         <p:spPr>
+          <a:xfrm>
+            <a:off x="952500" y="2425700"/>
+            <a:ext cx="11099800" cy="6286500"/>
+          </a:xfrm>
           <a:prstGeom prst="rect">
             <a:avLst/>
           </a:prstGeom>
@@ -3737,30 +3955,6 @@
           <a:bodyPr/>
           <a:lstStyle/>
           <a:p>
-            <a:pPr/>
-            <a:r>
-              <a:t>Shapes</a:t>
-            </a:r>
-          </a:p>
-        </p:txBody>
-      </p:sp>
-      <p:sp>
-        <p:nvSpPr>
-          <p:cNvPr id="134" name="Shape 134"/>
-          <p:cNvSpPr/>
-          <p:nvPr>
-            <p:ph type="body" idx="1"/>
-          </p:nvPr>
-        </p:nvSpPr>
-        <p:spPr>
-          <a:prstGeom prst="rect">
-            <a:avLst/>
-          </a:prstGeom>
-        </p:spPr>
-        <p:txBody>
-          <a:bodyPr/>
-          <a:lstStyle/>
-          <a:p>
             <a:pPr marL="422275" indent="-422275" defTabSz="554990">
               <a:spcBef>
                 <a:spcPts val="3900"/>
@@ -3824,6 +4018,65 @@
             </a:pPr>
             <a:r>
               <a:t>Paths (advanced stuff!)</a:t>
+            </a:r>
+          </a:p>
+        </p:txBody>
+      </p:sp>
+      <p:sp>
+        <p:nvSpPr>
+          <p:cNvPr id="136" name="Shape 136"/>
+          <p:cNvSpPr/>
+          <p:nvPr/>
+        </p:nvSpPr>
+        <p:spPr>
+          <a:xfrm>
+            <a:off x="-3308" y="181669"/>
+            <a:ext cx="13011416" cy="1409569"/>
+          </a:xfrm>
+          <a:prstGeom prst="rect">
+            <a:avLst/>
+          </a:prstGeom>
+          <a:gradFill>
+            <a:gsLst>
+              <a:gs pos="0">
+                <a:schemeClr val="accent2">
+                  <a:hueOff val="-2473793"/>
+                  <a:satOff val="-50209"/>
+                  <a:lumOff val="23543"/>
+                </a:schemeClr>
+              </a:gs>
+              <a:gs pos="100000">
+                <a:schemeClr val="accent2"/>
+              </a:gs>
+            </a:gsLst>
+            <a:lin ang="5400000"/>
+          </a:gradFill>
+          <a:ln w="12700">
+            <a:miter lim="400000"/>
+          </a:ln>
+          <a:extLst>
+            <a:ext uri="{C572A759-6A51-4108-AA02-DFA0A04FC94B}">
+              <ma14:wrappingTextBoxFlag xmlns:ma14="http://schemas.microsoft.com/office/mac/drawingml/2011/main" val="1"/>
+            </a:ext>
+          </a:extLst>
+        </p:spPr>
+        <p:txBody>
+          <a:bodyPr lIns="50800" tIns="50800" rIns="50800" bIns="50800" anchor="ctr">
+            <a:normAutofit fontScale="100000" lnSpcReduction="0"/>
+          </a:bodyPr>
+          <a:lstStyle>
+            <a:lvl1pPr>
+              <a:defRPr sz="8000">
+                <a:solidFill>
+                  <a:srgbClr val="FFFFFF"/>
+                </a:solidFill>
+              </a:defRPr>
+            </a:lvl1pPr>
+          </a:lstStyle>
+          <a:p>
+            <a:pPr/>
+            <a:r>
+              <a:t>Shapes</a:t>
             </a:r>
           </a:p>
         </p:txBody>
@@ -3856,20 +4109,55 @@
       </p:grpSpPr>
       <p:sp>
         <p:nvSpPr>
-          <p:cNvPr id="136" name="Shape 136"/>
+          <p:cNvPr id="138" name="Shape 138"/>
           <p:cNvSpPr/>
-          <p:nvPr>
-            <p:ph type="title"/>
-          </p:nvPr>
+          <p:nvPr/>
         </p:nvSpPr>
         <p:spPr>
+          <a:xfrm>
+            <a:off x="-3308" y="4008602"/>
+            <a:ext cx="13011416" cy="1409569"/>
+          </a:xfrm>
           <a:prstGeom prst="rect">
             <a:avLst/>
           </a:prstGeom>
+          <a:gradFill>
+            <a:gsLst>
+              <a:gs pos="0">
+                <a:schemeClr val="accent2">
+                  <a:hueOff val="-2473793"/>
+                  <a:satOff val="-50209"/>
+                  <a:lumOff val="23543"/>
+                </a:schemeClr>
+              </a:gs>
+              <a:gs pos="100000">
+                <a:schemeClr val="accent2"/>
+              </a:gs>
+            </a:gsLst>
+            <a:lin ang="5400000"/>
+          </a:gradFill>
+          <a:ln w="12700">
+            <a:miter lim="400000"/>
+          </a:ln>
+          <a:extLst>
+            <a:ext uri="{C572A759-6A51-4108-AA02-DFA0A04FC94B}">
+              <ma14:wrappingTextBoxFlag xmlns:ma14="http://schemas.microsoft.com/office/mac/drawingml/2011/main" val="1"/>
+            </a:ext>
+          </a:extLst>
         </p:spPr>
         <p:txBody>
-          <a:bodyPr/>
-          <a:lstStyle/>
+          <a:bodyPr lIns="50800" tIns="50800" rIns="50800" bIns="50800" anchor="ctr">
+            <a:normAutofit fontScale="100000" lnSpcReduction="0"/>
+          </a:bodyPr>
+          <a:lstStyle>
+            <a:lvl1pPr>
+              <a:defRPr sz="8000">
+                <a:solidFill>
+                  <a:srgbClr val="FFFFFF"/>
+                </a:solidFill>
+              </a:defRPr>
+            </a:lvl1pPr>
+          </a:lstStyle>
           <a:p>
             <a:pPr/>
             <a:r>
@@ -3906,31 +4194,7 @@
       </p:grpSpPr>
       <p:sp>
         <p:nvSpPr>
-          <p:cNvPr id="138" name="Shape 138"/>
-          <p:cNvSpPr/>
-          <p:nvPr>
-            <p:ph type="title"/>
-          </p:nvPr>
-        </p:nvSpPr>
-        <p:spPr>
-          <a:prstGeom prst="rect">
-            <a:avLst/>
-          </a:prstGeom>
-        </p:spPr>
-        <p:txBody>
-          <a:bodyPr/>
-          <a:lstStyle/>
-          <a:p>
-            <a:pPr/>
-            <a:r>
-              <a:t>SVG Files</a:t>
-            </a:r>
-          </a:p>
-        </p:txBody>
-      </p:sp>
-      <p:sp>
-        <p:nvSpPr>
-          <p:cNvPr id="139" name="Shape 139"/>
+          <p:cNvPr id="140" name="Shape 140"/>
           <p:cNvSpPr/>
           <p:nvPr>
             <p:ph type="body" sz="half" idx="1"/>
@@ -3972,7 +4236,7 @@
       </p:sp>
       <p:pic>
         <p:nvPicPr>
-          <p:cNvPr id="140" name="pasted-image.png"/>
+          <p:cNvPr id="141" name="pasted-image.png"/>
           <p:cNvPicPr>
             <a:picLocks noChangeAspect="1"/>
           </p:cNvPicPr>
@@ -3999,6 +4263,65 @@
           </a:ln>
         </p:spPr>
       </p:pic>
+      <p:sp>
+        <p:nvSpPr>
+          <p:cNvPr id="142" name="Shape 142"/>
+          <p:cNvSpPr/>
+          <p:nvPr/>
+        </p:nvSpPr>
+        <p:spPr>
+          <a:xfrm>
+            <a:off x="-3308" y="181669"/>
+            <a:ext cx="13011416" cy="1409569"/>
+          </a:xfrm>
+          <a:prstGeom prst="rect">
+            <a:avLst/>
+          </a:prstGeom>
+          <a:gradFill>
+            <a:gsLst>
+              <a:gs pos="0">
+                <a:schemeClr val="accent2">
+                  <a:hueOff val="-2473793"/>
+                  <a:satOff val="-50209"/>
+                  <a:lumOff val="23543"/>
+                </a:schemeClr>
+              </a:gs>
+              <a:gs pos="100000">
+                <a:schemeClr val="accent2"/>
+              </a:gs>
+            </a:gsLst>
+            <a:lin ang="5400000"/>
+          </a:gradFill>
+          <a:ln w="12700">
+            <a:miter lim="400000"/>
+          </a:ln>
+          <a:extLst>
+            <a:ext uri="{C572A759-6A51-4108-AA02-DFA0A04FC94B}">
+              <ma14:wrappingTextBoxFlag xmlns:ma14="http://schemas.microsoft.com/office/mac/drawingml/2011/main" val="1"/>
+            </a:ext>
+          </a:extLst>
+        </p:spPr>
+        <p:txBody>
+          <a:bodyPr lIns="50800" tIns="50800" rIns="50800" bIns="50800" anchor="ctr">
+            <a:normAutofit fontScale="100000" lnSpcReduction="0"/>
+          </a:bodyPr>
+          <a:lstStyle>
+            <a:lvl1pPr>
+              <a:defRPr sz="8000">
+                <a:solidFill>
+                  <a:srgbClr val="FFFFFF"/>
+                </a:solidFill>
+              </a:defRPr>
+            </a:lvl1pPr>
+          </a:lstStyle>
+          <a:p>
+            <a:pPr/>
+            <a:r>
+              <a:t>SVG Files</a:t>
+            </a:r>
+          </a:p>
+        </p:txBody>
+      </p:sp>
     </p:spTree>
   </p:cSld>
   <p:clrMapOvr>
@@ -4027,13 +4350,17 @@
       </p:grpSpPr>
       <p:sp>
         <p:nvSpPr>
-          <p:cNvPr id="142" name="Shape 142"/>
+          <p:cNvPr id="144" name="Shape 144"/>
           <p:cNvSpPr/>
           <p:nvPr>
-            <p:ph type="title"/>
+            <p:ph type="body" idx="1"/>
           </p:nvPr>
         </p:nvSpPr>
         <p:spPr>
+          <a:xfrm>
+            <a:off x="952500" y="2451100"/>
+            <a:ext cx="11099800" cy="6286500"/>
+          </a:xfrm>
           <a:prstGeom prst="rect">
             <a:avLst/>
           </a:prstGeom>
@@ -4042,30 +4369,6 @@
           <a:bodyPr/>
           <a:lstStyle/>
           <a:p>
-            <a:pPr/>
-            <a:r>
-              <a:t>More SVG references</a:t>
-            </a:r>
-          </a:p>
-        </p:txBody>
-      </p:sp>
-      <p:sp>
-        <p:nvSpPr>
-          <p:cNvPr id="143" name="Shape 143"/>
-          <p:cNvSpPr/>
-          <p:nvPr>
-            <p:ph type="body" idx="1"/>
-          </p:nvPr>
-        </p:nvSpPr>
-        <p:spPr>
-          <a:prstGeom prst="rect">
-            <a:avLst/>
-          </a:prstGeom>
-        </p:spPr>
-        <p:txBody>
-          <a:bodyPr/>
-          <a:lstStyle/>
-          <a:p>
             <a:pPr marL="355600" indent="-355600" defTabSz="467359">
               <a:spcBef>
                 <a:spcPts val="3300"/>
@@ -4162,6 +4465,65 @@
                 <a:hlinkClick r:id="rId5" invalidUrl="" action="" tgtFrame="" tooltip="" history="1" highlightClick="0" endSnd="0"/>
               </a:rPr>
               <a:t>https://twitter.com/SaraSoueidan</a:t>
+            </a:r>
+          </a:p>
+        </p:txBody>
+      </p:sp>
+      <p:sp>
+        <p:nvSpPr>
+          <p:cNvPr id="145" name="Shape 145"/>
+          <p:cNvSpPr/>
+          <p:nvPr/>
+        </p:nvSpPr>
+        <p:spPr>
+          <a:xfrm>
+            <a:off x="-3308" y="181669"/>
+            <a:ext cx="13011416" cy="1409569"/>
+          </a:xfrm>
+          <a:prstGeom prst="rect">
+            <a:avLst/>
+          </a:prstGeom>
+          <a:gradFill>
+            <a:gsLst>
+              <a:gs pos="0">
+                <a:schemeClr val="accent2">
+                  <a:hueOff val="-2473793"/>
+                  <a:satOff val="-50209"/>
+                  <a:lumOff val="23543"/>
+                </a:schemeClr>
+              </a:gs>
+              <a:gs pos="100000">
+                <a:schemeClr val="accent2"/>
+              </a:gs>
+            </a:gsLst>
+            <a:lin ang="5400000"/>
+          </a:gradFill>
+          <a:ln w="12700">
+            <a:miter lim="400000"/>
+          </a:ln>
+          <a:extLst>
+            <a:ext uri="{C572A759-6A51-4108-AA02-DFA0A04FC94B}">
+              <ma14:wrappingTextBoxFlag xmlns:ma14="http://schemas.microsoft.com/office/mac/drawingml/2011/main" val="1"/>
+            </a:ext>
+          </a:extLst>
+        </p:spPr>
+        <p:txBody>
+          <a:bodyPr lIns="50800" tIns="50800" rIns="50800" bIns="50800" anchor="ctr">
+            <a:normAutofit fontScale="100000" lnSpcReduction="0"/>
+          </a:bodyPr>
+          <a:lstStyle>
+            <a:lvl1pPr>
+              <a:defRPr sz="8000">
+                <a:solidFill>
+                  <a:srgbClr val="FFFFFF"/>
+                </a:solidFill>
+              </a:defRPr>
+            </a:lvl1pPr>
+          </a:lstStyle>
+          <a:p>
+            <a:pPr/>
+            <a:r>
+              <a:t>References</a:t>
             </a:r>
           </a:p>
         </p:txBody>

</xml_diff>